<commit_message>
weblogo for internal TTA was updated (more sequences were added)
</commit_message>
<xml_diff>
--- a/images/weblogo_aftr_internal.pptx
+++ b/images/weblogo_aftr_internal.pptx
@@ -208,7 +208,7 @@
           <a:p>
             <a:fld id="{C571D33F-B151-5442-9D79-DA0A881D815F}" type="datetimeFigureOut">
               <a:rPr lang="en-US" smtClean="0"/>
-              <a:t>6/12/23</a:t>
+              <a:t>8/31/23</a:t>
             </a:fld>
             <a:endParaRPr lang="en-US"/>
           </a:p>
@@ -743,7 +743,7 @@
           <a:p>
             <a:fld id="{01197F44-DB72-474A-9754-31703E05C006}" type="datetimeFigureOut">
               <a:rPr lang="en-US" smtClean="0"/>
-              <a:t>6/12/23</a:t>
+              <a:t>8/31/23</a:t>
             </a:fld>
             <a:endParaRPr lang="en-US"/>
           </a:p>
@@ -911,7 +911,7 @@
           <a:p>
             <a:fld id="{01197F44-DB72-474A-9754-31703E05C006}" type="datetimeFigureOut">
               <a:rPr lang="en-US" smtClean="0"/>
-              <a:t>6/12/23</a:t>
+              <a:t>8/31/23</a:t>
             </a:fld>
             <a:endParaRPr lang="en-US"/>
           </a:p>
@@ -1089,7 +1089,7 @@
           <a:p>
             <a:fld id="{01197F44-DB72-474A-9754-31703E05C006}" type="datetimeFigureOut">
               <a:rPr lang="en-US" smtClean="0"/>
-              <a:t>6/12/23</a:t>
+              <a:t>8/31/23</a:t>
             </a:fld>
             <a:endParaRPr lang="en-US"/>
           </a:p>
@@ -1257,7 +1257,7 @@
           <a:p>
             <a:fld id="{01197F44-DB72-474A-9754-31703E05C006}" type="datetimeFigureOut">
               <a:rPr lang="en-US" smtClean="0"/>
-              <a:t>6/12/23</a:t>
+              <a:t>8/31/23</a:t>
             </a:fld>
             <a:endParaRPr lang="en-US"/>
           </a:p>
@@ -1502,7 +1502,7 @@
           <a:p>
             <a:fld id="{01197F44-DB72-474A-9754-31703E05C006}" type="datetimeFigureOut">
               <a:rPr lang="en-US" smtClean="0"/>
-              <a:t>6/12/23</a:t>
+              <a:t>8/31/23</a:t>
             </a:fld>
             <a:endParaRPr lang="en-US"/>
           </a:p>
@@ -1787,7 +1787,7 @@
           <a:p>
             <a:fld id="{01197F44-DB72-474A-9754-31703E05C006}" type="datetimeFigureOut">
               <a:rPr lang="en-US" smtClean="0"/>
-              <a:t>6/12/23</a:t>
+              <a:t>8/31/23</a:t>
             </a:fld>
             <a:endParaRPr lang="en-US"/>
           </a:p>
@@ -2206,7 +2206,7 @@
           <a:p>
             <a:fld id="{01197F44-DB72-474A-9754-31703E05C006}" type="datetimeFigureOut">
               <a:rPr lang="en-US" smtClean="0"/>
-              <a:t>6/12/23</a:t>
+              <a:t>8/31/23</a:t>
             </a:fld>
             <a:endParaRPr lang="en-US"/>
           </a:p>
@@ -2323,7 +2323,7 @@
           <a:p>
             <a:fld id="{01197F44-DB72-474A-9754-31703E05C006}" type="datetimeFigureOut">
               <a:rPr lang="en-US" smtClean="0"/>
-              <a:t>6/12/23</a:t>
+              <a:t>8/31/23</a:t>
             </a:fld>
             <a:endParaRPr lang="en-US"/>
           </a:p>
@@ -2418,7 +2418,7 @@
           <a:p>
             <a:fld id="{01197F44-DB72-474A-9754-31703E05C006}" type="datetimeFigureOut">
               <a:rPr lang="en-US" smtClean="0"/>
-              <a:t>6/12/23</a:t>
+              <a:t>8/31/23</a:t>
             </a:fld>
             <a:endParaRPr lang="en-US"/>
           </a:p>
@@ -2693,7 +2693,7 @@
           <a:p>
             <a:fld id="{01197F44-DB72-474A-9754-31703E05C006}" type="datetimeFigureOut">
               <a:rPr lang="en-US" smtClean="0"/>
-              <a:t>6/12/23</a:t>
+              <a:t>8/31/23</a:t>
             </a:fld>
             <a:endParaRPr lang="en-US"/>
           </a:p>
@@ -2945,7 +2945,7 @@
           <a:p>
             <a:fld id="{01197F44-DB72-474A-9754-31703E05C006}" type="datetimeFigureOut">
               <a:rPr lang="en-US" smtClean="0"/>
-              <a:t>6/12/23</a:t>
+              <a:t>8/31/23</a:t>
             </a:fld>
             <a:endParaRPr lang="en-US"/>
           </a:p>
@@ -3156,7 +3156,7 @@
           <a:p>
             <a:fld id="{01197F44-DB72-474A-9754-31703E05C006}" type="datetimeFigureOut">
               <a:rPr lang="en-US" smtClean="0"/>
-              <a:t>6/12/23</a:t>
+              <a:t>8/31/23</a:t>
             </a:fld>
             <a:endParaRPr lang="en-US"/>
           </a:p>
@@ -3531,35 +3531,6 @@
           <a:chExt cx="0" cy="0"/>
         </a:xfrm>
       </p:grpSpPr>
-      <p:pic>
-        <p:nvPicPr>
-          <p:cNvPr id="31" name="Picture 30">
-            <a:extLst>
-              <a:ext uri="{FF2B5EF4-FFF2-40B4-BE49-F238E27FC236}">
-                <a16:creationId xmlns:a16="http://schemas.microsoft.com/office/drawing/2014/main" id="{8924796D-2195-D840-A643-64E4FAF04CF7}"/>
-              </a:ext>
-            </a:extLst>
-          </p:cNvPr>
-          <p:cNvPicPr>
-            <a:picLocks noChangeAspect="1"/>
-          </p:cNvPicPr>
-          <p:nvPr/>
-        </p:nvPicPr>
-        <p:blipFill rotWithShape="1">
-          <a:blip r:embed="rId3"/>
-          <a:srcRect b="6047"/>
-          <a:stretch/>
-        </p:blipFill>
-        <p:spPr>
-          <a:xfrm>
-            <a:off x="0" y="462634"/>
-            <a:ext cx="10515600" cy="1640804"/>
-          </a:xfrm>
-          <a:prstGeom prst="rect">
-            <a:avLst/>
-          </a:prstGeom>
-        </p:spPr>
-      </p:pic>
       <p:cxnSp>
         <p:nvCxnSpPr>
           <p:cNvPr id="32" name="Straight Connector 31">
@@ -3576,7 +3547,7 @@
         </p:nvCxnSpPr>
         <p:spPr>
           <a:xfrm flipH="1">
-            <a:off x="4871405" y="552335"/>
+            <a:off x="3908453" y="649811"/>
             <a:ext cx="520205" cy="0"/>
           </a:xfrm>
           <a:prstGeom prst="line">
@@ -3621,7 +3592,7 @@
         </p:nvSpPr>
         <p:spPr>
           <a:xfrm>
-            <a:off x="4637521" y="45401"/>
+            <a:off x="3674569" y="142877"/>
             <a:ext cx="987972" cy="506934"/>
           </a:xfrm>
           <a:prstGeom prst="rect">
@@ -3643,6 +3614,35 @@
           </a:p>
         </p:txBody>
       </p:sp>
+      <p:pic>
+        <p:nvPicPr>
+          <p:cNvPr id="2" name="Picture 1">
+            <a:extLst>
+              <a:ext uri="{FF2B5EF4-FFF2-40B4-BE49-F238E27FC236}">
+                <a16:creationId xmlns:a16="http://schemas.microsoft.com/office/drawing/2014/main" id="{FBCBB70C-3B60-7344-A7ED-B6E013F4B74F}"/>
+              </a:ext>
+            </a:extLst>
+          </p:cNvPr>
+          <p:cNvPicPr>
+            <a:picLocks noChangeAspect="1"/>
+          </p:cNvPicPr>
+          <p:nvPr/>
+        </p:nvPicPr>
+        <p:blipFill rotWithShape="1">
+          <a:blip r:embed="rId3"/>
+          <a:srcRect/>
+          <a:stretch/>
+        </p:blipFill>
+        <p:spPr>
+          <a:xfrm>
+            <a:off x="0" y="649811"/>
+            <a:ext cx="10515600" cy="1453627"/>
+          </a:xfrm>
+          <a:prstGeom prst="rect">
+            <a:avLst/>
+          </a:prstGeom>
+        </p:spPr>
+      </p:pic>
     </p:spTree>
     <p:extLst>
       <p:ext uri="{BB962C8B-B14F-4D97-AF65-F5344CB8AC3E}">

</xml_diff>